<commit_message>
New proposal added. Prepared for MPark's generation.
</commit_message>
<xml_diff>
--- a/P2667-VectorAllocatorForSBO/VectorAllocatorPresentation.pptx
+++ b/P2667-VectorAllocatorForSBO/VectorAllocatorPresentation.pptx
@@ -8596,7 +8596,23 @@
             </a:r>
             <a:r>
               <a:rPr lang="sv-SE" sz="3200" dirty="0"/>
-              <a:t>.</a:t>
+              <a:t>. [</a:t>
+            </a:r>
+            <a:r>
+              <a:rPr lang="sv-SE" sz="3200" dirty="0" err="1"/>
+              <a:t>Maybe</a:t>
+            </a:r>
+            <a:r>
+              <a:rPr lang="sv-SE" sz="3200" dirty="0"/>
+              <a:t> not in the </a:t>
+            </a:r>
+            <a:r>
+              <a:rPr lang="sv-SE" sz="3200" dirty="0" err="1"/>
+              <a:t>afternoon</a:t>
+            </a:r>
+            <a:r>
+              <a:rPr lang="sv-SE" sz="3200" dirty="0"/>
+              <a:t>! / Pablo]</a:t>
             </a:r>
           </a:p>
           <a:p>

</xml_diff>